<commit_message>
Enlarge the QR code.
</commit_message>
<xml_diff>
--- a/poster/odissei_poster.pptx
+++ b/poster/odissei_poster.pptx
@@ -6834,8 +6834,8 @@
         </p:blipFill>
         <p:spPr>
           <a:xfrm>
-            <a:off x="25496872" y="39199216"/>
-            <a:ext cx="2695884" cy="2695884"/>
+            <a:off x="25309497" y="38964682"/>
+            <a:ext cx="3303457" cy="3303457"/>
           </a:xfrm>
           <a:prstGeom prst="rect">
             <a:avLst/>

</xml_diff>

<commit_message>
Change VU logo into pure white one.
</commit_message>
<xml_diff>
--- a/poster/odissei_poster.pptx
+++ b/poster/odissei_poster.pptx
@@ -3322,7 +3322,7 @@
         </p:nvGrpSpPr>
         <p:grpSpPr>
           <a:xfrm>
-            <a:off x="1329084" y="3341330"/>
+            <a:off x="1329084" y="3455632"/>
             <a:ext cx="7541534" cy="3351001"/>
             <a:chOff x="10629204" y="10362990"/>
             <a:chExt cx="7541534" cy="3351001"/>
@@ -7104,38 +7104,49 @@
       </p:sp>
       <p:pic>
         <p:nvPicPr>
-          <p:cNvPr id="22" name="Graphic 21">
+          <p:cNvPr id="1028" name="Picture 4" descr="VU logo – VU BrandBook">
             <a:extLst>
               <a:ext uri="{FF2B5EF4-FFF2-40B4-BE49-F238E27FC236}">
-                <a16:creationId xmlns:a16="http://schemas.microsoft.com/office/drawing/2014/main" id="{A9FCF2EB-9566-A949-BF21-D2EE0A87F301}"/>
+                <a16:creationId xmlns:a16="http://schemas.microsoft.com/office/drawing/2014/main" id="{A11B8A86-D2F4-E970-A657-865307933FB7}"/>
               </a:ext>
             </a:extLst>
           </p:cNvPr>
           <p:cNvPicPr>
-            <a:picLocks noChangeAspect="1"/>
+            <a:picLocks noChangeAspect="1" noChangeArrowheads="1"/>
           </p:cNvPicPr>
           <p:nvPr/>
         </p:nvPicPr>
         <p:blipFill>
           <a:blip r:embed="rId12">
             <a:extLst>
-              <a:ext uri="{96DAC541-7B7A-43D3-8B79-37D633B846F1}">
-                <asvg:svgBlip xmlns:asvg="http://schemas.microsoft.com/office/drawing/2016/SVG/main" r:embed="rId13"/>
+              <a:ext uri="{28A0092B-C50C-407E-A947-70E740481C1C}">
+                <a14:useLocalDpi xmlns:a14="http://schemas.microsoft.com/office/drawing/2010/main" val="0"/>
               </a:ext>
             </a:extLst>
           </a:blip>
+          <a:srcRect/>
           <a:stretch>
             <a:fillRect/>
           </a:stretch>
         </p:blipFill>
-        <p:spPr>
+        <p:spPr bwMode="auto">
           <a:xfrm>
-            <a:off x="1850065" y="6723212"/>
-            <a:ext cx="6572176" cy="1967467"/>
+            <a:off x="1481608" y="6706619"/>
+            <a:ext cx="7192489" cy="2151178"/>
           </a:xfrm>
           <a:prstGeom prst="rect">
             <a:avLst/>
           </a:prstGeom>
+          <a:noFill/>
+          <a:extLst>
+            <a:ext uri="{909E8E84-426E-40DD-AFC4-6F175D3DCCD1}">
+              <a14:hiddenFill xmlns:a14="http://schemas.microsoft.com/office/drawing/2010/main">
+                <a:solidFill>
+                  <a:srgbClr val="FFFFFF"/>
+                </a:solidFill>
+              </a14:hiddenFill>
+            </a:ext>
+          </a:extLst>
         </p:spPr>
       </p:pic>
     </p:spTree>

</xml_diff>

<commit_message>
Change the vu logo back.
</commit_message>
<xml_diff>
--- a/poster/odissei_poster.pptx
+++ b/poster/odissei_poster.pptx
@@ -3389,8 +3389,8 @@
           </p:nvSpPr>
           <p:spPr>
             <a:xfrm>
-              <a:off x="13518581" y="12248716"/>
-              <a:ext cx="4285853" cy="453970"/>
+              <a:off x="13495212" y="12232422"/>
+              <a:ext cx="4367221" cy="461665"/>
             </a:xfrm>
             <a:prstGeom prst="rect">
               <a:avLst/>
@@ -6580,8 +6580,8 @@
         </p:blipFill>
         <p:spPr>
           <a:xfrm>
-            <a:off x="1850065" y="1097611"/>
-            <a:ext cx="6398424" cy="1762920"/>
+            <a:off x="1799264" y="1111701"/>
+            <a:ext cx="6481136" cy="1755180"/>
           </a:xfrm>
           <a:prstGeom prst="rect">
             <a:avLst/>
@@ -7104,49 +7104,38 @@
       </p:sp>
       <p:pic>
         <p:nvPicPr>
-          <p:cNvPr id="1028" name="Picture 4" descr="VU logo – VU BrandBook">
+          <p:cNvPr id="7" name="Graphic 6">
             <a:extLst>
               <a:ext uri="{FF2B5EF4-FFF2-40B4-BE49-F238E27FC236}">
-                <a16:creationId xmlns:a16="http://schemas.microsoft.com/office/drawing/2014/main" id="{A11B8A86-D2F4-E970-A657-865307933FB7}"/>
+                <a16:creationId xmlns:a16="http://schemas.microsoft.com/office/drawing/2014/main" id="{E37EE838-73F4-F490-027D-5CD9DAEFDBCA}"/>
               </a:ext>
             </a:extLst>
           </p:cNvPr>
           <p:cNvPicPr>
-            <a:picLocks noChangeAspect="1" noChangeArrowheads="1"/>
+            <a:picLocks noChangeAspect="1"/>
           </p:cNvPicPr>
           <p:nvPr/>
         </p:nvPicPr>
         <p:blipFill>
           <a:blip r:embed="rId12">
             <a:extLst>
-              <a:ext uri="{28A0092B-C50C-407E-A947-70E740481C1C}">
-                <a14:useLocalDpi xmlns:a14="http://schemas.microsoft.com/office/drawing/2010/main" val="0"/>
+              <a:ext uri="{96DAC541-7B7A-43D3-8B79-37D633B846F1}">
+                <asvg:svgBlip xmlns:asvg="http://schemas.microsoft.com/office/drawing/2016/SVG/main" r:embed="rId13"/>
               </a:ext>
             </a:extLst>
           </a:blip>
-          <a:srcRect/>
           <a:stretch>
             <a:fillRect/>
           </a:stretch>
         </p:blipFill>
-        <p:spPr bwMode="auto">
+        <p:spPr>
           <a:xfrm>
-            <a:off x="1481608" y="6706619"/>
-            <a:ext cx="7192489" cy="2151178"/>
+            <a:off x="1860224" y="7049368"/>
+            <a:ext cx="6481136" cy="1940213"/>
           </a:xfrm>
           <a:prstGeom prst="rect">
             <a:avLst/>
           </a:prstGeom>
-          <a:noFill/>
-          <a:extLst>
-            <a:ext uri="{909E8E84-426E-40DD-AFC4-6F175D3DCCD1}">
-              <a14:hiddenFill xmlns:a14="http://schemas.microsoft.com/office/drawing/2010/main">
-                <a:solidFill>
-                  <a:srgbClr val="FFFFFF"/>
-                </a:solidFill>
-              </a14:hiddenFill>
-            </a:ext>
-          </a:extLst>
         </p:spPr>
       </p:pic>
     </p:spTree>

</xml_diff>